<commit_message>
Update Week_14_Lecture_2 (solving example problems).pptx
</commit_message>
<xml_diff>
--- a/PPT Slides/Week_14_Lecture_2 (solving example problems).pptx
+++ b/PPT Slides/Week_14_Lecture_2 (solving example problems).pptx
@@ -5,17 +5,16 @@
     <p:sldMasterId id="2147483648" r:id="rId1"/>
   </p:sldMasterIdLst>
   <p:notesMasterIdLst>
-    <p:notesMasterId r:id="rId10"/>
+    <p:notesMasterId r:id="rId9"/>
   </p:notesMasterIdLst>
   <p:sldIdLst>
     <p:sldId id="256" r:id="rId2"/>
-    <p:sldId id="520" r:id="rId3"/>
-    <p:sldId id="519" r:id="rId4"/>
-    <p:sldId id="522" r:id="rId5"/>
-    <p:sldId id="523" r:id="rId6"/>
-    <p:sldId id="521" r:id="rId7"/>
-    <p:sldId id="524" r:id="rId8"/>
-    <p:sldId id="525" r:id="rId9"/>
+    <p:sldId id="522" r:id="rId3"/>
+    <p:sldId id="523" r:id="rId4"/>
+    <p:sldId id="521" r:id="rId5"/>
+    <p:sldId id="524" r:id="rId6"/>
+    <p:sldId id="525" r:id="rId7"/>
+    <p:sldId id="526" r:id="rId8"/>
   </p:sldIdLst>
   <p:sldSz cx="12192000" cy="6858000"/>
   <p:notesSz cx="6858000" cy="9144000"/>
@@ -204,7 +203,7 @@
           <a:p>
             <a:fld id="{D3A945AC-70EB-403B-9610-C4726E471E92}" type="datetimeFigureOut">
               <a:rPr lang="en-US" smtClean="0"/>
-              <a:t>12/1/2022</a:t>
+              <a:t>12/1/22</a:t>
             </a:fld>
             <a:endParaRPr lang="en-US"/>
           </a:p>
@@ -621,7 +620,7 @@
           <a:p>
             <a:fld id="{6BAAB186-9E99-4F38-BB4F-99E52B20A6CC}" type="datetime1">
               <a:rPr lang="en-US" smtClean="0"/>
-              <a:t>12/1/2022</a:t>
+              <a:t>12/1/22</a:t>
             </a:fld>
             <a:endParaRPr lang="en-US"/>
           </a:p>
@@ -821,7 +820,7 @@
           <a:p>
             <a:fld id="{B0FA7BCA-710D-4544-97A1-B0A8F8D85794}" type="datetime1">
               <a:rPr lang="en-US" smtClean="0"/>
-              <a:t>12/1/2022</a:t>
+              <a:t>12/1/22</a:t>
             </a:fld>
             <a:endParaRPr lang="en-US"/>
           </a:p>
@@ -1031,7 +1030,7 @@
           <a:p>
             <a:fld id="{F3FE12C4-866D-4D1E-BFDD-37C1ADBA272B}" type="datetime1">
               <a:rPr lang="en-US" smtClean="0"/>
-              <a:t>12/1/2022</a:t>
+              <a:t>12/1/22</a:t>
             </a:fld>
             <a:endParaRPr lang="en-US"/>
           </a:p>
@@ -1231,7 +1230,7 @@
           <a:p>
             <a:fld id="{9623E461-9596-41A8-9C84-FDB592432A9F}" type="datetime1">
               <a:rPr lang="en-US" smtClean="0"/>
-              <a:t>12/1/2022</a:t>
+              <a:t>12/1/22</a:t>
             </a:fld>
             <a:endParaRPr lang="en-US"/>
           </a:p>
@@ -1507,7 +1506,7 @@
           <a:p>
             <a:fld id="{5998576D-E5C4-4209-82BF-E60523340835}" type="datetime1">
               <a:rPr lang="en-US" smtClean="0"/>
-              <a:t>12/1/2022</a:t>
+              <a:t>12/1/22</a:t>
             </a:fld>
             <a:endParaRPr lang="en-US"/>
           </a:p>
@@ -1775,7 +1774,7 @@
           <a:p>
             <a:fld id="{844969E6-C4FA-4089-8241-15DC0309B506}" type="datetime1">
               <a:rPr lang="en-US" smtClean="0"/>
-              <a:t>12/1/2022</a:t>
+              <a:t>12/1/22</a:t>
             </a:fld>
             <a:endParaRPr lang="en-US"/>
           </a:p>
@@ -2190,7 +2189,7 @@
           <a:p>
             <a:fld id="{8D3DA843-449B-4064-96F1-0462FF7E142A}" type="datetime1">
               <a:rPr lang="en-US" smtClean="0"/>
-              <a:t>12/1/2022</a:t>
+              <a:t>12/1/22</a:t>
             </a:fld>
             <a:endParaRPr lang="en-US"/>
           </a:p>
@@ -2332,7 +2331,7 @@
           <a:p>
             <a:fld id="{70BE43CC-F5E0-430E-ACFC-0898CE012FE2}" type="datetime1">
               <a:rPr lang="en-US" smtClean="0"/>
-              <a:t>12/1/2022</a:t>
+              <a:t>12/1/22</a:t>
             </a:fld>
             <a:endParaRPr lang="en-US"/>
           </a:p>
@@ -2445,7 +2444,7 @@
           <a:p>
             <a:fld id="{FD990634-3648-4E88-9B2C-3D3D590AB872}" type="datetime1">
               <a:rPr lang="en-US" smtClean="0"/>
-              <a:t>12/1/2022</a:t>
+              <a:t>12/1/22</a:t>
             </a:fld>
             <a:endParaRPr lang="en-US"/>
           </a:p>
@@ -2758,7 +2757,7 @@
           <a:p>
             <a:fld id="{A886E98E-C578-44AD-8AD2-CAB080A26467}" type="datetime1">
               <a:rPr lang="en-US" smtClean="0"/>
-              <a:t>12/1/2022</a:t>
+              <a:t>12/1/22</a:t>
             </a:fld>
             <a:endParaRPr lang="en-US"/>
           </a:p>
@@ -3047,7 +3046,7 @@
           <a:p>
             <a:fld id="{2E6EECD3-992A-47AE-8D22-3F1161A55C13}" type="datetime1">
               <a:rPr lang="en-US" smtClean="0"/>
-              <a:t>12/1/2022</a:t>
+              <a:t>12/1/22</a:t>
             </a:fld>
             <a:endParaRPr lang="en-US"/>
           </a:p>
@@ -3290,7 +3289,7 @@
           <a:p>
             <a:fld id="{6F73E1B1-F47A-4B7C-B1D9-A3E655E9BEDE}" type="datetime1">
               <a:rPr lang="en-US" smtClean="0"/>
-              <a:t>12/1/2022</a:t>
+              <a:t>12/1/22</a:t>
             </a:fld>
             <a:endParaRPr lang="en-US"/>
           </a:p>
@@ -4066,946 +4065,6 @@
         <p:spPr>
           <a:xfrm>
             <a:off x="685800" y="541973"/>
-            <a:ext cx="1673728" cy="461665"/>
-          </a:xfrm>
-          <a:prstGeom prst="rect">
-            <a:avLst/>
-          </a:prstGeom>
-          <a:noFill/>
-        </p:spPr>
-        <p:txBody>
-          <a:bodyPr wrap="none" rtlCol="0">
-            <a:spAutoFit/>
-          </a:bodyPr>
-          <a:lstStyle/>
-          <a:p>
-            <a:r>
-              <a:rPr lang="en-US" sz="2400" b="1" dirty="0">
-                <a:latin typeface="Times New Roman" panose="02020603050405020304" pitchFamily="18" charset="0"/>
-                <a:cs typeface="Times New Roman" panose="02020603050405020304" pitchFamily="18" charset="0"/>
-              </a:rPr>
-              <a:t>Problem 11</a:t>
-            </a:r>
-          </a:p>
-        </p:txBody>
-      </p:sp>
-      <p:sp>
-        <p:nvSpPr>
-          <p:cNvPr id="2" name="TextBox 1">
-            <a:extLst>
-              <a:ext uri="{FF2B5EF4-FFF2-40B4-BE49-F238E27FC236}">
-                <a16:creationId xmlns:a16="http://schemas.microsoft.com/office/drawing/2014/main" id="{9D999470-675F-10CE-2CFC-18DA9EDB489D}"/>
-              </a:ext>
-            </a:extLst>
-          </p:cNvPr>
-          <p:cNvSpPr txBox="1"/>
-          <p:nvPr/>
-        </p:nvSpPr>
-        <p:spPr>
-          <a:xfrm>
-            <a:off x="685800" y="1070662"/>
-            <a:ext cx="10421471" cy="646331"/>
-          </a:xfrm>
-          <a:prstGeom prst="rect">
-            <a:avLst/>
-          </a:prstGeom>
-          <a:noFill/>
-        </p:spPr>
-        <p:txBody>
-          <a:bodyPr wrap="square" rtlCol="0">
-            <a:spAutoFit/>
-          </a:bodyPr>
-          <a:lstStyle/>
-          <a:p>
-            <a:pPr algn="just"/>
-            <a:r>
-              <a:rPr lang="en-US" dirty="0">
-                <a:solidFill>
-                  <a:srgbClr val="202124"/>
-                </a:solidFill>
-                <a:latin typeface="Times New Roman" panose="02020603050405020304" pitchFamily="18" charset="0"/>
-                <a:cs typeface="Times New Roman" panose="02020603050405020304" pitchFamily="18" charset="0"/>
-              </a:rPr>
-              <a:t>Program a function </a:t>
-            </a:r>
-            <a:r>
-              <a:rPr lang="en-US" dirty="0">
-                <a:solidFill>
-                  <a:srgbClr val="202124"/>
-                </a:solidFill>
-                <a:latin typeface="Consolas" panose="020B0609020204030204" pitchFamily="49" charset="0"/>
-                <a:cs typeface="Times New Roman" panose="02020603050405020304" pitchFamily="18" charset="0"/>
-              </a:rPr>
-              <a:t>draw(n) </a:t>
-            </a:r>
-            <a:r>
-              <a:rPr lang="en-US" dirty="0">
-                <a:solidFill>
-                  <a:srgbClr val="202124"/>
-                </a:solidFill>
-                <a:latin typeface="Times New Roman" panose="02020603050405020304" pitchFamily="18" charset="0"/>
-                <a:cs typeface="Times New Roman" panose="02020603050405020304" pitchFamily="18" charset="0"/>
-              </a:rPr>
-              <a:t>which divides the </a:t>
-            </a:r>
-            <a:r>
-              <a:rPr lang="en-US" i="1" dirty="0">
-                <a:solidFill>
-                  <a:srgbClr val="202124"/>
-                </a:solidFill>
-                <a:latin typeface="Times New Roman" panose="02020603050405020304" pitchFamily="18" charset="0"/>
-                <a:cs typeface="Times New Roman" panose="02020603050405020304" pitchFamily="18" charset="0"/>
-              </a:rPr>
-              <a:t>x</a:t>
-            </a:r>
-            <a:r>
-              <a:rPr lang="en-US" dirty="0">
-                <a:solidFill>
-                  <a:srgbClr val="202124"/>
-                </a:solidFill>
-                <a:latin typeface="Times New Roman" panose="02020603050405020304" pitchFamily="18" charset="0"/>
-                <a:cs typeface="Times New Roman" panose="02020603050405020304" pitchFamily="18" charset="0"/>
-              </a:rPr>
-              <a:t>- and </a:t>
-            </a:r>
-            <a:r>
-              <a:rPr lang="en-US" i="1" dirty="0">
-                <a:solidFill>
-                  <a:srgbClr val="202124"/>
-                </a:solidFill>
-                <a:latin typeface="Times New Roman" panose="02020603050405020304" pitchFamily="18" charset="0"/>
-                <a:cs typeface="Times New Roman" panose="02020603050405020304" pitchFamily="18" charset="0"/>
-              </a:rPr>
-              <a:t>y</a:t>
-            </a:r>
-            <a:r>
-              <a:rPr lang="en-US" dirty="0">
-                <a:solidFill>
-                  <a:srgbClr val="202124"/>
-                </a:solidFill>
-                <a:latin typeface="Times New Roman" panose="02020603050405020304" pitchFamily="18" charset="0"/>
-                <a:cs typeface="Times New Roman" panose="02020603050405020304" pitchFamily="18" charset="0"/>
-              </a:rPr>
-              <a:t>-axis from 0  to 1 into </a:t>
-            </a:r>
-            <a:r>
-              <a:rPr lang="en-US" dirty="0">
-                <a:solidFill>
-                  <a:srgbClr val="202124"/>
-                </a:solidFill>
-                <a:latin typeface="Consolas" panose="020B0609020204030204" pitchFamily="49" charset="0"/>
-                <a:cs typeface="Times New Roman" panose="02020603050405020304" pitchFamily="18" charset="0"/>
-              </a:rPr>
-              <a:t>n</a:t>
-            </a:r>
-            <a:r>
-              <a:rPr lang="en-US" dirty="0">
-                <a:solidFill>
-                  <a:srgbClr val="202124"/>
-                </a:solidFill>
-                <a:latin typeface="Times New Roman" panose="02020603050405020304" pitchFamily="18" charset="0"/>
-                <a:cs typeface="Times New Roman" panose="02020603050405020304" pitchFamily="18" charset="0"/>
-              </a:rPr>
-              <a:t> points and draw </a:t>
-            </a:r>
-            <a:r>
-              <a:rPr lang="en-US" dirty="0">
-                <a:solidFill>
-                  <a:srgbClr val="202124"/>
-                </a:solidFill>
-                <a:latin typeface="Consolas" panose="020B0609020204030204" pitchFamily="49" charset="0"/>
-                <a:cs typeface="Times New Roman" panose="02020603050405020304" pitchFamily="18" charset="0"/>
-              </a:rPr>
-              <a:t>n</a:t>
-            </a:r>
-            <a:r>
-              <a:rPr lang="en-US" dirty="0">
-                <a:solidFill>
-                  <a:srgbClr val="202124"/>
-                </a:solidFill>
-                <a:latin typeface="Times New Roman" panose="02020603050405020304" pitchFamily="18" charset="0"/>
-                <a:cs typeface="Times New Roman" panose="02020603050405020304" pitchFamily="18" charset="0"/>
-              </a:rPr>
-              <a:t> lines between the points on these two axis as depicted below.</a:t>
-            </a:r>
-          </a:p>
-        </p:txBody>
-      </p:sp>
-      <p:sp>
-        <p:nvSpPr>
-          <p:cNvPr id="13" name="TextBox 12">
-            <a:extLst>
-              <a:ext uri="{FF2B5EF4-FFF2-40B4-BE49-F238E27FC236}">
-                <a16:creationId xmlns:a16="http://schemas.microsoft.com/office/drawing/2014/main" id="{02E6C802-F2A7-E970-0B41-58E8AA772687}"/>
-              </a:ext>
-            </a:extLst>
-          </p:cNvPr>
-          <p:cNvSpPr txBox="1"/>
-          <p:nvPr/>
-        </p:nvSpPr>
-        <p:spPr>
-          <a:xfrm>
-            <a:off x="685800" y="2016129"/>
-            <a:ext cx="1100165" cy="369332"/>
-          </a:xfrm>
-          <a:prstGeom prst="rect">
-            <a:avLst/>
-          </a:prstGeom>
-          <a:noFill/>
-        </p:spPr>
-        <p:txBody>
-          <a:bodyPr wrap="square" rtlCol="0">
-            <a:spAutoFit/>
-          </a:bodyPr>
-          <a:lstStyle/>
-          <a:p>
-            <a:pPr algn="just"/>
-            <a:r>
-              <a:rPr lang="en-US" dirty="0">
-                <a:solidFill>
-                  <a:srgbClr val="202124"/>
-                </a:solidFill>
-                <a:latin typeface="Times New Roman" panose="02020603050405020304" pitchFamily="18" charset="0"/>
-                <a:cs typeface="Times New Roman" panose="02020603050405020304" pitchFamily="18" charset="0"/>
-              </a:rPr>
-              <a:t>Test case</a:t>
-            </a:r>
-            <a:endParaRPr lang="en-US" dirty="0">
-              <a:latin typeface="Times New Roman" panose="02020603050405020304" pitchFamily="18" charset="0"/>
-              <a:cs typeface="Times New Roman" panose="02020603050405020304" pitchFamily="18" charset="0"/>
-            </a:endParaRPr>
-          </a:p>
-        </p:txBody>
-      </p:sp>
-      <p:pic>
-        <p:nvPicPr>
-          <p:cNvPr id="7" name="Picture 6">
-            <a:extLst>
-              <a:ext uri="{FF2B5EF4-FFF2-40B4-BE49-F238E27FC236}">
-                <a16:creationId xmlns:a16="http://schemas.microsoft.com/office/drawing/2014/main" id="{B7FF1A3A-18F8-6238-D7C7-30FBBE44EDFC}"/>
-              </a:ext>
-            </a:extLst>
-          </p:cNvPr>
-          <p:cNvPicPr>
-            <a:picLocks noChangeAspect="1"/>
-          </p:cNvPicPr>
-          <p:nvPr/>
-        </p:nvPicPr>
-        <p:blipFill>
-          <a:blip r:embed="rId3"/>
-          <a:stretch>
-            <a:fillRect/>
-          </a:stretch>
-        </p:blipFill>
-        <p:spPr>
-          <a:xfrm>
-            <a:off x="2359528" y="2614971"/>
-            <a:ext cx="3099112" cy="2982686"/>
-          </a:xfrm>
-          <a:prstGeom prst="rect">
-            <a:avLst/>
-          </a:prstGeom>
-        </p:spPr>
-      </p:pic>
-      <p:pic>
-        <p:nvPicPr>
-          <p:cNvPr id="11" name="Picture 10">
-            <a:extLst>
-              <a:ext uri="{FF2B5EF4-FFF2-40B4-BE49-F238E27FC236}">
-                <a16:creationId xmlns:a16="http://schemas.microsoft.com/office/drawing/2014/main" id="{B15D9313-BEC4-6032-1636-4CFFA398EE86}"/>
-              </a:ext>
-            </a:extLst>
-          </p:cNvPr>
-          <p:cNvPicPr>
-            <a:picLocks noChangeAspect="1"/>
-          </p:cNvPicPr>
-          <p:nvPr/>
-        </p:nvPicPr>
-        <p:blipFill>
-          <a:blip r:embed="rId4"/>
-          <a:stretch>
-            <a:fillRect/>
-          </a:stretch>
-        </p:blipFill>
-        <p:spPr>
-          <a:xfrm>
-            <a:off x="6107993" y="2623287"/>
-            <a:ext cx="3015950" cy="2966054"/>
-          </a:xfrm>
-          <a:prstGeom prst="rect">
-            <a:avLst/>
-          </a:prstGeom>
-        </p:spPr>
-      </p:pic>
-      <mc:AlternateContent xmlns:mc="http://schemas.openxmlformats.org/markup-compatibility/2006" xmlns:a14="http://schemas.microsoft.com/office/drawing/2010/main">
-        <mc:Choice Requires="a14">
-          <p:sp>
-            <p:nvSpPr>
-              <p:cNvPr id="14" name="TextBox 13">
-                <a:extLst>
-                  <a:ext uri="{FF2B5EF4-FFF2-40B4-BE49-F238E27FC236}">
-                    <a16:creationId xmlns:a16="http://schemas.microsoft.com/office/drawing/2014/main" id="{F9E73149-BA52-99BF-ED53-A956569515EF}"/>
-                  </a:ext>
-                </a:extLst>
-              </p:cNvPr>
-              <p:cNvSpPr txBox="1"/>
-              <p:nvPr/>
-            </p:nvSpPr>
-            <p:spPr>
-              <a:xfrm>
-                <a:off x="3359001" y="5790901"/>
-                <a:ext cx="1100165" cy="369332"/>
-              </a:xfrm>
-              <a:prstGeom prst="rect">
-                <a:avLst/>
-              </a:prstGeom>
-              <a:noFill/>
-            </p:spPr>
-            <p:txBody>
-              <a:bodyPr wrap="square" rtlCol="0">
-                <a:spAutoFit/>
-              </a:bodyPr>
-              <a:lstStyle/>
-              <a:p>
-                <a:pPr algn="just"/>
-                <a14:m>
-                  <m:oMathPara xmlns:m="http://schemas.openxmlformats.org/officeDocument/2006/math">
-                    <m:oMathParaPr>
-                      <m:jc m:val="centerGroup"/>
-                    </m:oMathParaPr>
-                    <m:oMath xmlns:m="http://schemas.openxmlformats.org/officeDocument/2006/math">
-                      <m:r>
-                        <a:rPr lang="en-US" i="1" dirty="0" smtClean="0">
-                          <a:solidFill>
-                            <a:srgbClr val="202124"/>
-                          </a:solidFill>
-                          <a:latin typeface="Cambria Math" panose="02040503050406030204" pitchFamily="18" charset="0"/>
-                          <a:cs typeface="Times New Roman" panose="02020603050405020304" pitchFamily="18" charset="0"/>
-                        </a:rPr>
-                        <m:t>𝑛</m:t>
-                      </m:r>
-                      <m:r>
-                        <a:rPr lang="en-US" i="1" dirty="0" smtClean="0">
-                          <a:solidFill>
-                            <a:srgbClr val="202124"/>
-                          </a:solidFill>
-                          <a:latin typeface="Cambria Math" panose="02040503050406030204" pitchFamily="18" charset="0"/>
-                          <a:cs typeface="Times New Roman" panose="02020603050405020304" pitchFamily="18" charset="0"/>
-                        </a:rPr>
-                        <m:t>=5</m:t>
-                      </m:r>
-                    </m:oMath>
-                  </m:oMathPara>
-                </a14:m>
-                <a:endParaRPr lang="en-US" dirty="0">
-                  <a:latin typeface="Times New Roman" panose="02020603050405020304" pitchFamily="18" charset="0"/>
-                  <a:cs typeface="Times New Roman" panose="02020603050405020304" pitchFamily="18" charset="0"/>
-                </a:endParaRPr>
-              </a:p>
-            </p:txBody>
-          </p:sp>
-        </mc:Choice>
-        <mc:Fallback xmlns="">
-          <p:sp>
-            <p:nvSpPr>
-              <p:cNvPr id="14" name="TextBox 13">
-                <a:extLst>
-                  <a:ext uri="{FF2B5EF4-FFF2-40B4-BE49-F238E27FC236}">
-                    <a16:creationId xmlns:a16="http://schemas.microsoft.com/office/drawing/2014/main" id="{F9E73149-BA52-99BF-ED53-A956569515EF}"/>
-                  </a:ext>
-                </a:extLst>
-              </p:cNvPr>
-              <p:cNvSpPr txBox="1">
-                <a:spLocks noRot="1" noChangeAspect="1" noMove="1" noResize="1" noEditPoints="1" noAdjustHandles="1" noChangeArrowheads="1" noChangeShapeType="1" noTextEdit="1"/>
-              </p:cNvSpPr>
-              <p:nvPr/>
-            </p:nvSpPr>
-            <p:spPr>
-              <a:xfrm>
-                <a:off x="3359001" y="5790901"/>
-                <a:ext cx="1100165" cy="369332"/>
-              </a:xfrm>
-              <a:prstGeom prst="rect">
-                <a:avLst/>
-              </a:prstGeom>
-              <a:blipFill>
-                <a:blip r:embed="rId5"/>
-                <a:stretch>
-                  <a:fillRect/>
-                </a:stretch>
-              </a:blipFill>
-            </p:spPr>
-            <p:txBody>
-              <a:bodyPr/>
-              <a:lstStyle/>
-              <a:p>
-                <a:r>
-                  <a:rPr lang="en-US">
-                    <a:noFill/>
-                  </a:rPr>
-                  <a:t> </a:t>
-                </a:r>
-              </a:p>
-            </p:txBody>
-          </p:sp>
-        </mc:Fallback>
-      </mc:AlternateContent>
-      <mc:AlternateContent xmlns:mc="http://schemas.openxmlformats.org/markup-compatibility/2006" xmlns:a14="http://schemas.microsoft.com/office/drawing/2010/main">
-        <mc:Choice Requires="a14">
-          <p:sp>
-            <p:nvSpPr>
-              <p:cNvPr id="15" name="TextBox 14">
-                <a:extLst>
-                  <a:ext uri="{FF2B5EF4-FFF2-40B4-BE49-F238E27FC236}">
-                    <a16:creationId xmlns:a16="http://schemas.microsoft.com/office/drawing/2014/main" id="{D4F37A1C-DCE6-C82A-B567-6C5F466653AB}"/>
-                  </a:ext>
-                </a:extLst>
-              </p:cNvPr>
-              <p:cNvSpPr txBox="1"/>
-              <p:nvPr/>
-            </p:nvSpPr>
-            <p:spPr>
-              <a:xfrm>
-                <a:off x="7065885" y="5790901"/>
-                <a:ext cx="1100165" cy="369332"/>
-              </a:xfrm>
-              <a:prstGeom prst="rect">
-                <a:avLst/>
-              </a:prstGeom>
-              <a:noFill/>
-            </p:spPr>
-            <p:txBody>
-              <a:bodyPr wrap="square" rtlCol="0">
-                <a:spAutoFit/>
-              </a:bodyPr>
-              <a:lstStyle/>
-              <a:p>
-                <a:pPr algn="just"/>
-                <a14:m>
-                  <m:oMathPara xmlns:m="http://schemas.openxmlformats.org/officeDocument/2006/math">
-                    <m:oMathParaPr>
-                      <m:jc m:val="centerGroup"/>
-                    </m:oMathParaPr>
-                    <m:oMath xmlns:m="http://schemas.openxmlformats.org/officeDocument/2006/math">
-                      <m:r>
-                        <a:rPr lang="en-US" i="1" dirty="0" smtClean="0">
-                          <a:solidFill>
-                            <a:srgbClr val="202124"/>
-                          </a:solidFill>
-                          <a:latin typeface="Cambria Math" panose="02040503050406030204" pitchFamily="18" charset="0"/>
-                          <a:cs typeface="Times New Roman" panose="02020603050405020304" pitchFamily="18" charset="0"/>
-                        </a:rPr>
-                        <m:t>𝑛</m:t>
-                      </m:r>
-                      <m:r>
-                        <a:rPr lang="en-US" i="1" dirty="0" smtClean="0">
-                          <a:solidFill>
-                            <a:srgbClr val="202124"/>
-                          </a:solidFill>
-                          <a:latin typeface="Cambria Math" panose="02040503050406030204" pitchFamily="18" charset="0"/>
-                          <a:cs typeface="Times New Roman" panose="02020603050405020304" pitchFamily="18" charset="0"/>
-                        </a:rPr>
-                        <m:t>=30</m:t>
-                      </m:r>
-                    </m:oMath>
-                  </m:oMathPara>
-                </a14:m>
-                <a:endParaRPr lang="en-US" dirty="0">
-                  <a:latin typeface="Times New Roman" panose="02020603050405020304" pitchFamily="18" charset="0"/>
-                  <a:cs typeface="Times New Roman" panose="02020603050405020304" pitchFamily="18" charset="0"/>
-                </a:endParaRPr>
-              </a:p>
-            </p:txBody>
-          </p:sp>
-        </mc:Choice>
-        <mc:Fallback xmlns="">
-          <p:sp>
-            <p:nvSpPr>
-              <p:cNvPr id="15" name="TextBox 14">
-                <a:extLst>
-                  <a:ext uri="{FF2B5EF4-FFF2-40B4-BE49-F238E27FC236}">
-                    <a16:creationId xmlns:a16="http://schemas.microsoft.com/office/drawing/2014/main" id="{D4F37A1C-DCE6-C82A-B567-6C5F466653AB}"/>
-                  </a:ext>
-                </a:extLst>
-              </p:cNvPr>
-              <p:cNvSpPr txBox="1">
-                <a:spLocks noRot="1" noChangeAspect="1" noMove="1" noResize="1" noEditPoints="1" noAdjustHandles="1" noChangeArrowheads="1" noChangeShapeType="1" noTextEdit="1"/>
-              </p:cNvSpPr>
-              <p:nvPr/>
-            </p:nvSpPr>
-            <p:spPr>
-              <a:xfrm>
-                <a:off x="7065885" y="5790901"/>
-                <a:ext cx="1100165" cy="369332"/>
-              </a:xfrm>
-              <a:prstGeom prst="rect">
-                <a:avLst/>
-              </a:prstGeom>
-              <a:blipFill>
-                <a:blip r:embed="rId6"/>
-                <a:stretch>
-                  <a:fillRect/>
-                </a:stretch>
-              </a:blipFill>
-            </p:spPr>
-            <p:txBody>
-              <a:bodyPr/>
-              <a:lstStyle/>
-              <a:p>
-                <a:r>
-                  <a:rPr lang="en-US">
-                    <a:noFill/>
-                  </a:rPr>
-                  <a:t> </a:t>
-                </a:r>
-              </a:p>
-            </p:txBody>
-          </p:sp>
-        </mc:Fallback>
-      </mc:AlternateContent>
-    </p:spTree>
-    <p:extLst>
-      <p:ext uri="{BB962C8B-B14F-4D97-AF65-F5344CB8AC3E}">
-        <p14:creationId xmlns:p14="http://schemas.microsoft.com/office/powerpoint/2010/main" val="174203275"/>
-      </p:ext>
-    </p:extLst>
-  </p:cSld>
-  <p:clrMapOvr>
-    <a:masterClrMapping/>
-  </p:clrMapOvr>
-</p:sld>
-</file>
-
-<file path=ppt/slides/slide3.xml><?xml version="1.0" encoding="utf-8"?>
-<p:sld xmlns:a="http://schemas.openxmlformats.org/drawingml/2006/main" xmlns:r="http://schemas.openxmlformats.org/officeDocument/2006/relationships" xmlns:p="http://schemas.openxmlformats.org/presentationml/2006/main">
-  <p:cSld>
-    <p:spTree>
-      <p:nvGrpSpPr>
-        <p:cNvPr id="1" name=""/>
-        <p:cNvGrpSpPr/>
-        <p:nvPr/>
-      </p:nvGrpSpPr>
-      <p:grpSpPr>
-        <a:xfrm>
-          <a:off x="0" y="0"/>
-          <a:ext cx="0" cy="0"/>
-          <a:chOff x="0" y="0"/>
-          <a:chExt cx="0" cy="0"/>
-        </a:xfrm>
-      </p:grpSpPr>
-      <p:pic>
-        <p:nvPicPr>
-          <p:cNvPr id="11" name="Picture 10">
-            <a:extLst>
-              <a:ext uri="{FF2B5EF4-FFF2-40B4-BE49-F238E27FC236}">
-                <a16:creationId xmlns:a16="http://schemas.microsoft.com/office/drawing/2014/main" id="{12C22C8D-17B2-D44B-C325-C8EDA400FFFE}"/>
-              </a:ext>
-            </a:extLst>
-          </p:cNvPr>
-          <p:cNvPicPr>
-            <a:picLocks noChangeAspect="1"/>
-          </p:cNvPicPr>
-          <p:nvPr/>
-        </p:nvPicPr>
-        <p:blipFill>
-          <a:blip r:embed="rId2"/>
-          <a:stretch>
-            <a:fillRect/>
-          </a:stretch>
-        </p:blipFill>
-        <p:spPr>
-          <a:xfrm>
-            <a:off x="4721107" y="771526"/>
-            <a:ext cx="6584295" cy="5774054"/>
-          </a:xfrm>
-          <a:prstGeom prst="rect">
-            <a:avLst/>
-          </a:prstGeom>
-        </p:spPr>
-      </p:pic>
-      <p:pic>
-        <p:nvPicPr>
-          <p:cNvPr id="4" name="그림 3">
-            <a:extLst>
-              <a:ext uri="{FF2B5EF4-FFF2-40B4-BE49-F238E27FC236}">
-                <a16:creationId xmlns:a16="http://schemas.microsoft.com/office/drawing/2014/main" id="{8F2FC6DF-8A6F-403A-AA02-B6B4C9067787}"/>
-              </a:ext>
-            </a:extLst>
-          </p:cNvPr>
-          <p:cNvPicPr>
-            <a:picLocks noChangeAspect="1"/>
-          </p:cNvPicPr>
-          <p:nvPr/>
-        </p:nvPicPr>
-        <p:blipFill>
-          <a:blip r:embed="rId3">
-            <a:extLst>
-              <a:ext uri="{28A0092B-C50C-407E-A947-70E740481C1C}">
-                <a14:useLocalDpi xmlns:a14="http://schemas.microsoft.com/office/drawing/2010/main" val="0"/>
-              </a:ext>
-            </a:extLst>
-          </a:blip>
-          <a:stretch>
-            <a:fillRect/>
-          </a:stretch>
-        </p:blipFill>
-        <p:spPr>
-          <a:xfrm>
-            <a:off x="9852657" y="312420"/>
-            <a:ext cx="1929944" cy="459106"/>
-          </a:xfrm>
-          <a:prstGeom prst="rect">
-            <a:avLst/>
-          </a:prstGeom>
-        </p:spPr>
-      </p:pic>
-      <p:sp>
-        <p:nvSpPr>
-          <p:cNvPr id="6" name="TextBox 5">
-            <a:extLst>
-              <a:ext uri="{FF2B5EF4-FFF2-40B4-BE49-F238E27FC236}">
-                <a16:creationId xmlns:a16="http://schemas.microsoft.com/office/drawing/2014/main" id="{6B810AD5-3DC8-4063-B4A1-183D1E07F9AC}"/>
-              </a:ext>
-            </a:extLst>
-          </p:cNvPr>
-          <p:cNvSpPr txBox="1"/>
-          <p:nvPr/>
-        </p:nvSpPr>
-        <p:spPr>
-          <a:xfrm>
-            <a:off x="685800" y="6419850"/>
-            <a:ext cx="4402166" cy="338554"/>
-          </a:xfrm>
-          <a:prstGeom prst="rect">
-            <a:avLst/>
-          </a:prstGeom>
-          <a:noFill/>
-        </p:spPr>
-        <p:txBody>
-          <a:bodyPr wrap="none" rtlCol="0">
-            <a:spAutoFit/>
-          </a:bodyPr>
-          <a:lstStyle/>
-          <a:p>
-            <a:pPr algn="ctr"/>
-            <a:r>
-              <a:rPr lang="en-US" sz="1600" dirty="0">
-                <a:latin typeface="Times New Roman" panose="02020603050405020304" pitchFamily="18" charset="0"/>
-                <a:cs typeface="Times New Roman" panose="02020603050405020304" pitchFamily="18" charset="0"/>
-              </a:rPr>
-              <a:t>College of Engineering, Sungkyunkwan University</a:t>
-            </a:r>
-          </a:p>
-        </p:txBody>
-      </p:sp>
-      <p:sp>
-        <p:nvSpPr>
-          <p:cNvPr id="8" name="슬라이드 번호 개체 틀 7">
-            <a:extLst>
-              <a:ext uri="{FF2B5EF4-FFF2-40B4-BE49-F238E27FC236}">
-                <a16:creationId xmlns:a16="http://schemas.microsoft.com/office/drawing/2014/main" id="{1C98A4CD-21DD-4BE6-9253-67C2B946A1BA}"/>
-              </a:ext>
-            </a:extLst>
-          </p:cNvPr>
-          <p:cNvSpPr>
-            <a:spLocks noGrp="1"/>
-          </p:cNvSpPr>
-          <p:nvPr>
-            <p:ph type="sldNum" sz="quarter" idx="12"/>
-          </p:nvPr>
-        </p:nvSpPr>
-        <p:spPr>
-          <a:xfrm>
-            <a:off x="8635796" y="6352037"/>
-            <a:ext cx="2743200" cy="365125"/>
-          </a:xfrm>
-        </p:spPr>
-        <p:txBody>
-          <a:bodyPr/>
-          <a:lstStyle/>
-          <a:p>
-            <a:fld id="{9318389C-6274-4595-9193-E59B961447B6}" type="slidenum">
-              <a:rPr lang="en-US" smtClean="0"/>
-              <a:t>3</a:t>
-            </a:fld>
-            <a:endParaRPr lang="en-US"/>
-          </a:p>
-        </p:txBody>
-      </p:sp>
-      <p:sp>
-        <p:nvSpPr>
-          <p:cNvPr id="5" name="TextBox 4">
-            <a:extLst>
-              <a:ext uri="{FF2B5EF4-FFF2-40B4-BE49-F238E27FC236}">
-                <a16:creationId xmlns:a16="http://schemas.microsoft.com/office/drawing/2014/main" id="{9895DA42-3FA4-43B2-21F4-1D33B800424A}"/>
-              </a:ext>
-            </a:extLst>
-          </p:cNvPr>
-          <p:cNvSpPr txBox="1"/>
-          <p:nvPr/>
-        </p:nvSpPr>
-        <p:spPr>
-          <a:xfrm>
-            <a:off x="685800" y="541973"/>
-            <a:ext cx="1673728" cy="461665"/>
-          </a:xfrm>
-          <a:prstGeom prst="rect">
-            <a:avLst/>
-          </a:prstGeom>
-          <a:noFill/>
-        </p:spPr>
-        <p:txBody>
-          <a:bodyPr wrap="none" rtlCol="0">
-            <a:spAutoFit/>
-          </a:bodyPr>
-          <a:lstStyle/>
-          <a:p>
-            <a:r>
-              <a:rPr lang="en-US" sz="2400" b="1" dirty="0">
-                <a:latin typeface="Times New Roman" panose="02020603050405020304" pitchFamily="18" charset="0"/>
-                <a:cs typeface="Times New Roman" panose="02020603050405020304" pitchFamily="18" charset="0"/>
-              </a:rPr>
-              <a:t>Problem 11</a:t>
-            </a:r>
-          </a:p>
-        </p:txBody>
-      </p:sp>
-      <p:pic>
-        <p:nvPicPr>
-          <p:cNvPr id="10" name="Picture 9">
-            <a:extLst>
-              <a:ext uri="{FF2B5EF4-FFF2-40B4-BE49-F238E27FC236}">
-                <a16:creationId xmlns:a16="http://schemas.microsoft.com/office/drawing/2014/main" id="{A69C4681-DFC5-52F9-A503-E1B0B31E0389}"/>
-              </a:ext>
-            </a:extLst>
-          </p:cNvPr>
-          <p:cNvPicPr>
-            <a:picLocks noChangeAspect="1"/>
-          </p:cNvPicPr>
-          <p:nvPr/>
-        </p:nvPicPr>
-        <p:blipFill>
-          <a:blip r:embed="rId4">
-            <a:clrChange>
-              <a:clrFrom>
-                <a:srgbClr val="F7F7F7"/>
-              </a:clrFrom>
-              <a:clrTo>
-                <a:srgbClr val="F7F7F7">
-                  <a:alpha val="0"/>
-                </a:srgbClr>
-              </a:clrTo>
-            </a:clrChange>
-          </a:blip>
-          <a:stretch>
-            <a:fillRect/>
-          </a:stretch>
-        </p:blipFill>
-        <p:spPr>
-          <a:xfrm>
-            <a:off x="5087966" y="1050126"/>
-            <a:ext cx="5076825" cy="2085975"/>
-          </a:xfrm>
-          <a:prstGeom prst="rect">
-            <a:avLst/>
-          </a:prstGeom>
-        </p:spPr>
-      </p:pic>
-      <p:pic>
-        <p:nvPicPr>
-          <p:cNvPr id="13" name="Picture 12">
-            <a:extLst>
-              <a:ext uri="{FF2B5EF4-FFF2-40B4-BE49-F238E27FC236}">
-                <a16:creationId xmlns:a16="http://schemas.microsoft.com/office/drawing/2014/main" id="{09D0D277-B320-F986-3F23-D4289042E0BB}"/>
-              </a:ext>
-            </a:extLst>
-          </p:cNvPr>
-          <p:cNvPicPr>
-            <a:picLocks noChangeAspect="1"/>
-          </p:cNvPicPr>
-          <p:nvPr/>
-        </p:nvPicPr>
-        <p:blipFill>
-          <a:blip r:embed="rId5">
-            <a:clrChange>
-              <a:clrFrom>
-                <a:srgbClr val="FFFFFF"/>
-              </a:clrFrom>
-              <a:clrTo>
-                <a:srgbClr val="FFFFFF">
-                  <a:alpha val="0"/>
-                </a:srgbClr>
-              </a:clrTo>
-            </a:clrChange>
-          </a:blip>
-          <a:stretch>
-            <a:fillRect/>
-          </a:stretch>
-        </p:blipFill>
-        <p:spPr>
-          <a:xfrm>
-            <a:off x="5087966" y="3282214"/>
-            <a:ext cx="3015950" cy="2966054"/>
-          </a:xfrm>
-          <a:prstGeom prst="rect">
-            <a:avLst/>
-          </a:prstGeom>
-        </p:spPr>
-      </p:pic>
-    </p:spTree>
-    <p:extLst>
-      <p:ext uri="{BB962C8B-B14F-4D97-AF65-F5344CB8AC3E}">
-        <p14:creationId xmlns:p14="http://schemas.microsoft.com/office/powerpoint/2010/main" val="1787068903"/>
-      </p:ext>
-    </p:extLst>
-  </p:cSld>
-  <p:clrMapOvr>
-    <a:masterClrMapping/>
-  </p:clrMapOvr>
-</p:sld>
-</file>
-
-<file path=ppt/slides/slide4.xml><?xml version="1.0" encoding="utf-8"?>
-<p:sld xmlns:a="http://schemas.openxmlformats.org/drawingml/2006/main" xmlns:r="http://schemas.openxmlformats.org/officeDocument/2006/relationships" xmlns:p="http://schemas.openxmlformats.org/presentationml/2006/main">
-  <p:cSld>
-    <p:spTree>
-      <p:nvGrpSpPr>
-        <p:cNvPr id="1" name=""/>
-        <p:cNvGrpSpPr/>
-        <p:nvPr/>
-      </p:nvGrpSpPr>
-      <p:grpSpPr>
-        <a:xfrm>
-          <a:off x="0" y="0"/>
-          <a:ext cx="0" cy="0"/>
-          <a:chOff x="0" y="0"/>
-          <a:chExt cx="0" cy="0"/>
-        </a:xfrm>
-      </p:grpSpPr>
-      <p:pic>
-        <p:nvPicPr>
-          <p:cNvPr id="4" name="그림 3">
-            <a:extLst>
-              <a:ext uri="{FF2B5EF4-FFF2-40B4-BE49-F238E27FC236}">
-                <a16:creationId xmlns:a16="http://schemas.microsoft.com/office/drawing/2014/main" id="{8F2FC6DF-8A6F-403A-AA02-B6B4C9067787}"/>
-              </a:ext>
-            </a:extLst>
-          </p:cNvPr>
-          <p:cNvPicPr>
-            <a:picLocks noChangeAspect="1"/>
-          </p:cNvPicPr>
-          <p:nvPr/>
-        </p:nvPicPr>
-        <p:blipFill>
-          <a:blip r:embed="rId2">
-            <a:extLst>
-              <a:ext uri="{28A0092B-C50C-407E-A947-70E740481C1C}">
-                <a14:useLocalDpi xmlns:a14="http://schemas.microsoft.com/office/drawing/2010/main" val="0"/>
-              </a:ext>
-            </a:extLst>
-          </a:blip>
-          <a:stretch>
-            <a:fillRect/>
-          </a:stretch>
-        </p:blipFill>
-        <p:spPr>
-          <a:xfrm>
-            <a:off x="9852657" y="312420"/>
-            <a:ext cx="1929944" cy="459106"/>
-          </a:xfrm>
-          <a:prstGeom prst="rect">
-            <a:avLst/>
-          </a:prstGeom>
-        </p:spPr>
-      </p:pic>
-      <p:sp>
-        <p:nvSpPr>
-          <p:cNvPr id="6" name="TextBox 5">
-            <a:extLst>
-              <a:ext uri="{FF2B5EF4-FFF2-40B4-BE49-F238E27FC236}">
-                <a16:creationId xmlns:a16="http://schemas.microsoft.com/office/drawing/2014/main" id="{6B810AD5-3DC8-4063-B4A1-183D1E07F9AC}"/>
-              </a:ext>
-            </a:extLst>
-          </p:cNvPr>
-          <p:cNvSpPr txBox="1"/>
-          <p:nvPr/>
-        </p:nvSpPr>
-        <p:spPr>
-          <a:xfrm>
-            <a:off x="685800" y="6419850"/>
-            <a:ext cx="4402166" cy="338554"/>
-          </a:xfrm>
-          <a:prstGeom prst="rect">
-            <a:avLst/>
-          </a:prstGeom>
-          <a:noFill/>
-        </p:spPr>
-        <p:txBody>
-          <a:bodyPr wrap="none" rtlCol="0">
-            <a:spAutoFit/>
-          </a:bodyPr>
-          <a:lstStyle/>
-          <a:p>
-            <a:pPr algn="ctr"/>
-            <a:r>
-              <a:rPr lang="en-US" sz="1600" dirty="0">
-                <a:latin typeface="Times New Roman" panose="02020603050405020304" pitchFamily="18" charset="0"/>
-                <a:cs typeface="Times New Roman" panose="02020603050405020304" pitchFamily="18" charset="0"/>
-              </a:rPr>
-              <a:t>College of Engineering, Sungkyunkwan University</a:t>
-            </a:r>
-          </a:p>
-        </p:txBody>
-      </p:sp>
-      <p:sp>
-        <p:nvSpPr>
-          <p:cNvPr id="8" name="슬라이드 번호 개체 틀 7">
-            <a:extLst>
-              <a:ext uri="{FF2B5EF4-FFF2-40B4-BE49-F238E27FC236}">
-                <a16:creationId xmlns:a16="http://schemas.microsoft.com/office/drawing/2014/main" id="{1C98A4CD-21DD-4BE6-9253-67C2B946A1BA}"/>
-              </a:ext>
-            </a:extLst>
-          </p:cNvPr>
-          <p:cNvSpPr>
-            <a:spLocks noGrp="1"/>
-          </p:cNvSpPr>
-          <p:nvPr>
-            <p:ph type="sldNum" sz="quarter" idx="12"/>
-          </p:nvPr>
-        </p:nvSpPr>
-        <p:spPr>
-          <a:xfrm>
-            <a:off x="8635796" y="6352037"/>
-            <a:ext cx="2743200" cy="365125"/>
-          </a:xfrm>
-        </p:spPr>
-        <p:txBody>
-          <a:bodyPr/>
-          <a:lstStyle/>
-          <a:p>
-            <a:fld id="{9318389C-6274-4595-9193-E59B961447B6}" type="slidenum">
-              <a:rPr lang="en-US" smtClean="0"/>
-              <a:t>4</a:t>
-            </a:fld>
-            <a:endParaRPr lang="en-US"/>
-          </a:p>
-        </p:txBody>
-      </p:sp>
-      <p:sp>
-        <p:nvSpPr>
-          <p:cNvPr id="5" name="TextBox 4">
-            <a:extLst>
-              <a:ext uri="{FF2B5EF4-FFF2-40B4-BE49-F238E27FC236}">
-                <a16:creationId xmlns:a16="http://schemas.microsoft.com/office/drawing/2014/main" id="{9895DA42-3FA4-43B2-21F4-1D33B800424A}"/>
-              </a:ext>
-            </a:extLst>
-          </p:cNvPr>
-          <p:cNvSpPr txBox="1"/>
-          <p:nvPr/>
-        </p:nvSpPr>
-        <p:spPr>
-          <a:xfrm>
-            <a:off x="685800" y="541973"/>
             <a:ext cx="1690719" cy="461665"/>
           </a:xfrm>
           <a:prstGeom prst="rect">
@@ -5201,7 +4260,7 @@
 </p:sld>
 </file>
 
-<file path=ppt/slides/slide5.xml><?xml version="1.0" encoding="utf-8"?>
+<file path=ppt/slides/slide3.xml><?xml version="1.0" encoding="utf-8"?>
 <p:sld xmlns:a="http://schemas.openxmlformats.org/drawingml/2006/main" xmlns:r="http://schemas.openxmlformats.org/officeDocument/2006/relationships" xmlns:p="http://schemas.openxmlformats.org/presentationml/2006/main">
   <p:cSld>
     <p:spTree>
@@ -5321,7 +4380,7 @@
           <a:p>
             <a:fld id="{9318389C-6274-4595-9193-E59B961447B6}" type="slidenum">
               <a:rPr lang="en-US" smtClean="0"/>
-              <a:t>5</a:t>
+              <a:t>3</a:t>
             </a:fld>
             <a:endParaRPr lang="en-US"/>
           </a:p>
@@ -7904,7 +6963,7 @@
 </p:sld>
 </file>
 
-<file path=ppt/slides/slide6.xml><?xml version="1.0" encoding="utf-8"?>
+<file path=ppt/slides/slide4.xml><?xml version="1.0" encoding="utf-8"?>
 <p:sld xmlns:a="http://schemas.openxmlformats.org/drawingml/2006/main" xmlns:r="http://schemas.openxmlformats.org/officeDocument/2006/relationships" xmlns:p="http://schemas.openxmlformats.org/presentationml/2006/main">
   <p:cSld>
     <p:spTree>
@@ -8054,7 +7113,7 @@
           <a:p>
             <a:fld id="{9318389C-6274-4595-9193-E59B961447B6}" type="slidenum">
               <a:rPr lang="en-US" smtClean="0"/>
-              <a:t>6</a:t>
+              <a:t>4</a:t>
             </a:fld>
             <a:endParaRPr lang="en-US"/>
           </a:p>
@@ -8193,7 +7252,7 @@
 </p:sld>
 </file>
 
-<file path=ppt/slides/slide7.xml><?xml version="1.0" encoding="utf-8"?>
+<file path=ppt/slides/slide5.xml><?xml version="1.0" encoding="utf-8"?>
 <p:sld xmlns:a="http://schemas.openxmlformats.org/drawingml/2006/main" xmlns:r="http://schemas.openxmlformats.org/officeDocument/2006/relationships" xmlns:p="http://schemas.openxmlformats.org/presentationml/2006/main">
   <p:cSld>
     <p:spTree>
@@ -8313,7 +7372,7 @@
           <a:p>
             <a:fld id="{9318389C-6274-4595-9193-E59B961447B6}" type="slidenum">
               <a:rPr lang="en-US" smtClean="0"/>
-              <a:t>7</a:t>
+              <a:t>5</a:t>
             </a:fld>
             <a:endParaRPr lang="en-US"/>
           </a:p>
@@ -8371,8 +7430,8 @@
         </p:nvSpPr>
         <p:spPr>
           <a:xfrm>
-            <a:off x="685800" y="1070662"/>
-            <a:ext cx="10421471" cy="369332"/>
+            <a:off x="729342" y="1070662"/>
+            <a:ext cx="10421471" cy="646331"/>
           </a:xfrm>
           <a:prstGeom prst="rect">
             <a:avLst/>
@@ -8444,7 +7503,7 @@
                 <a:latin typeface="Times New Roman" panose="02020603050405020304" pitchFamily="18" charset="0"/>
                 <a:cs typeface="Times New Roman" panose="02020603050405020304" pitchFamily="18" charset="0"/>
               </a:rPr>
-              <a:t> stairs to the top.</a:t>
+              <a:t> stairs to the top. Rule: Can only take 1 or 2 steps</a:t>
             </a:r>
           </a:p>
         </p:txBody>
@@ -9277,7 +8336,7 @@
 </p:sld>
 </file>
 
-<file path=ppt/slides/slide8.xml><?xml version="1.0" encoding="utf-8"?>
+<file path=ppt/slides/slide6.xml><?xml version="1.0" encoding="utf-8"?>
 <p:sld xmlns:a="http://schemas.openxmlformats.org/drawingml/2006/main" xmlns:r="http://schemas.openxmlformats.org/officeDocument/2006/relationships" xmlns:p="http://schemas.openxmlformats.org/presentationml/2006/main">
   <p:cSld>
     <p:spTree>
@@ -9427,7 +8486,7 @@
           <a:p>
             <a:fld id="{9318389C-6274-4595-9193-E59B961447B6}" type="slidenum">
               <a:rPr lang="en-US" smtClean="0"/>
-              <a:t>8</a:t>
+              <a:t>6</a:t>
             </a:fld>
             <a:endParaRPr lang="en-US"/>
           </a:p>
@@ -9557,6 +8616,125 @@
     <p:extLst>
       <p:ext uri="{BB962C8B-B14F-4D97-AF65-F5344CB8AC3E}">
         <p14:creationId xmlns:p14="http://schemas.microsoft.com/office/powerpoint/2010/main" val="3612334446"/>
+      </p:ext>
+    </p:extLst>
+  </p:cSld>
+  <p:clrMapOvr>
+    <a:masterClrMapping/>
+  </p:clrMapOvr>
+</p:sld>
+</file>
+
+<file path=ppt/slides/slide7.xml><?xml version="1.0" encoding="utf-8"?>
+<p:sld xmlns:a="http://schemas.openxmlformats.org/drawingml/2006/main" xmlns:r="http://schemas.openxmlformats.org/officeDocument/2006/relationships" xmlns:p="http://schemas.openxmlformats.org/presentationml/2006/main">
+  <p:cSld>
+    <p:spTree>
+      <p:nvGrpSpPr>
+        <p:cNvPr id="1" name=""/>
+        <p:cNvGrpSpPr/>
+        <p:nvPr/>
+      </p:nvGrpSpPr>
+      <p:grpSpPr>
+        <a:xfrm>
+          <a:off x="0" y="0"/>
+          <a:ext cx="0" cy="0"/>
+          <a:chOff x="0" y="0"/>
+          <a:chExt cx="0" cy="0"/>
+        </a:xfrm>
+      </p:grpSpPr>
+      <p:sp>
+        <p:nvSpPr>
+          <p:cNvPr id="2" name="Title 1">
+            <a:extLst>
+              <a:ext uri="{FF2B5EF4-FFF2-40B4-BE49-F238E27FC236}">
+                <a16:creationId xmlns:a16="http://schemas.microsoft.com/office/drawing/2014/main" id="{A96166CE-16FC-06AC-DC49-E13B3E88B9A8}"/>
+              </a:ext>
+            </a:extLst>
+          </p:cNvPr>
+          <p:cNvSpPr>
+            <a:spLocks noGrp="1"/>
+          </p:cNvSpPr>
+          <p:nvPr>
+            <p:ph type="title"/>
+          </p:nvPr>
+        </p:nvSpPr>
+        <p:spPr/>
+        <p:txBody>
+          <a:bodyPr/>
+          <a:lstStyle/>
+          <a:p>
+            <a:endParaRPr lang="en-KR"/>
+          </a:p>
+        </p:txBody>
+      </p:sp>
+      <p:pic>
+        <p:nvPicPr>
+          <p:cNvPr id="6" name="Content Placeholder 5" descr="A white board with writing on it&#10;&#10;Description automatically generated">
+            <a:extLst>
+              <a:ext uri="{FF2B5EF4-FFF2-40B4-BE49-F238E27FC236}">
+                <a16:creationId xmlns:a16="http://schemas.microsoft.com/office/drawing/2014/main" id="{640FF56B-34C8-DA16-9358-E5DC69BEFA2F}"/>
+              </a:ext>
+            </a:extLst>
+          </p:cNvPr>
+          <p:cNvPicPr>
+            <a:picLocks noGrp="1" noChangeAspect="1"/>
+          </p:cNvPicPr>
+          <p:nvPr>
+            <p:ph idx="1"/>
+          </p:nvPr>
+        </p:nvPicPr>
+        <p:blipFill>
+          <a:blip r:embed="rId2">
+            <a:extLst>
+              <a:ext uri="{28A0092B-C50C-407E-A947-70E740481C1C}">
+                <a14:useLocalDpi xmlns:a14="http://schemas.microsoft.com/office/drawing/2010/main" val="0"/>
+              </a:ext>
+            </a:extLst>
+          </a:blip>
+          <a:stretch>
+            <a:fillRect/>
+          </a:stretch>
+        </p:blipFill>
+        <p:spPr>
+          <a:xfrm>
+            <a:off x="3195108" y="1825625"/>
+            <a:ext cx="5801784" cy="4351338"/>
+          </a:xfrm>
+        </p:spPr>
+      </p:pic>
+      <p:sp>
+        <p:nvSpPr>
+          <p:cNvPr id="4" name="Slide Number Placeholder 3">
+            <a:extLst>
+              <a:ext uri="{FF2B5EF4-FFF2-40B4-BE49-F238E27FC236}">
+                <a16:creationId xmlns:a16="http://schemas.microsoft.com/office/drawing/2014/main" id="{FF74E1C2-5F24-6D8A-9FAD-85564B8FD785}"/>
+              </a:ext>
+            </a:extLst>
+          </p:cNvPr>
+          <p:cNvSpPr>
+            <a:spLocks noGrp="1"/>
+          </p:cNvSpPr>
+          <p:nvPr>
+            <p:ph type="sldNum" sz="quarter" idx="12"/>
+          </p:nvPr>
+        </p:nvSpPr>
+        <p:spPr/>
+        <p:txBody>
+          <a:bodyPr/>
+          <a:lstStyle/>
+          <a:p>
+            <a:fld id="{9318389C-6274-4595-9193-E59B961447B6}" type="slidenum">
+              <a:rPr lang="en-US" smtClean="0"/>
+              <a:t>7</a:t>
+            </a:fld>
+            <a:endParaRPr lang="en-US"/>
+          </a:p>
+        </p:txBody>
+      </p:sp>
+    </p:spTree>
+    <p:extLst>
+      <p:ext uri="{BB962C8B-B14F-4D97-AF65-F5344CB8AC3E}">
+        <p14:creationId xmlns:p14="http://schemas.microsoft.com/office/powerpoint/2010/main" val="3012190315"/>
       </p:ext>
     </p:extLst>
   </p:cSld>

</xml_diff>